<commit_message>
embedded font on pptx
</commit_message>
<xml_diff>
--- a/AngularJS Presentation.pptx
+++ b/AngularJS Presentation.pptx
@@ -1,6 +1,6 @@
 
 <file path=ppt/presentation.xml><?xml version="1.0" encoding="utf-8"?>
-<p:presentation xmlns:a="http://schemas.openxmlformats.org/drawingml/2006/main" xmlns:r="http://schemas.openxmlformats.org/officeDocument/2006/relationships" xmlns:p="http://schemas.openxmlformats.org/presentationml/2006/main" autoCompressPictures="0">
+<p:presentation xmlns:a="http://schemas.openxmlformats.org/drawingml/2006/main" xmlns:r="http://schemas.openxmlformats.org/officeDocument/2006/relationships" xmlns:p="http://schemas.openxmlformats.org/presentationml/2006/main" embedTrueTypeFonts="1" autoCompressPictures="0">
   <p:sldMasterIdLst>
     <p:sldMasterId id="2147483965" r:id="rId1"/>
   </p:sldMasterIdLst>
@@ -11,6 +11,33 @@
   </p:sldIdLst>
   <p:sldSz cx="12192000" cy="6858000"/>
   <p:notesSz cx="6858000" cy="9144000"/>
+  <p:embeddedFontLst>
+    <p:embeddedFont>
+      <p:font typeface="Calisto MT" panose="02040603050505030304" pitchFamily="18" charset="0"/>
+      <p:regular r:id="rId5"/>
+      <p:bold r:id="rId6"/>
+      <p:italic r:id="rId7"/>
+      <p:boldItalic r:id="rId8"/>
+    </p:embeddedFont>
+    <p:embeddedFont>
+      <p:font typeface="Wingdings 2" panose="05020102010507070707" pitchFamily="18" charset="2"/>
+      <p:regular r:id="rId9"/>
+    </p:embeddedFont>
+    <p:embeddedFont>
+      <p:font typeface="Trebuchet MS" panose="020B0603020202020204" pitchFamily="34" charset="0"/>
+      <p:regular r:id="rId10"/>
+      <p:bold r:id="rId11"/>
+      <p:italic r:id="rId12"/>
+      <p:boldItalic r:id="rId13"/>
+    </p:embeddedFont>
+    <p:embeddedFont>
+      <p:font typeface="Roboto Condensed" pitchFamily="2" charset="0"/>
+      <p:regular r:id="rId14"/>
+      <p:bold r:id="rId15"/>
+      <p:italic r:id="rId16"/>
+      <p:boldItalic r:id="rId17"/>
+    </p:embeddedFont>
+  </p:embeddedFontLst>
   <p:defaultTextStyle>
     <a:defPPr>
       <a:defRPr lang="en-US"/>
@@ -106,6 +133,11 @@
       </a:defRPr>
     </a:lvl9pPr>
   </p:defaultTextStyle>
+  <p:extLst>
+    <p:ext uri="{EFAFB233-063F-42B5-8137-9DF3F51BA10A}">
+      <p15:sldGuideLst xmlns:p15="http://schemas.microsoft.com/office/powerpoint/2012/main"/>
+    </p:ext>
+  </p:extLst>
 </p:presentation>
 </file>
 

</xml_diff>